<commit_message>
Add slides on Cmdlets and book references.
</commit_message>
<xml_diff>
--- a/Powershell ETL framework.pptx
+++ b/Powershell ETL framework.pptx
@@ -10,6 +10,9 @@
     <p:sldId id="257" r:id="rId4"/>
     <p:sldId id="258" r:id="rId5"/>
     <p:sldId id="260" r:id="rId6"/>
+    <p:sldId id="261" r:id="rId7"/>
+    <p:sldId id="262" r:id="rId8"/>
+    <p:sldId id="263" r:id="rId9"/>
   </p:sldIdLst>
   <p:sldSz cx="12192000" cy="6858000"/>
   <p:notesSz cx="6858000" cy="9144000"/>
@@ -4207,8 +4210,13 @@
           <a:p>
             <a:r>
               <a:rPr lang="en-US" dirty="0"/>
-              <a:t>Implement PowerShell code in a module </a:t>
-            </a:r>
+              <a:t>Implement PowerShell code in a module called </a:t>
+            </a:r>
+            <a:r>
+              <a:rPr lang="en-US" dirty="0" err="1"/>
+              <a:t>ImportFramework</a:t>
+            </a:r>
+            <a:endParaRPr lang="en-US" dirty="0"/>
           </a:p>
           <a:p>
             <a:r>
@@ -4323,13 +4331,13 @@
           <a:p>
             <a:r>
               <a:rPr lang="en-US" dirty="0"/>
-              <a:t>Import .CSV files</a:t>
-            </a:r>
-          </a:p>
-          <a:p>
-            <a:r>
-              <a:rPr lang="en-US" dirty="0"/>
-              <a:t>Table name is CSV file name without extension</a:t>
+              <a:t>Import .CSV files only</a:t>
+            </a:r>
+          </a:p>
+          <a:p>
+            <a:r>
+              <a:rPr lang="en-US" dirty="0"/>
+              <a:t>Staging table name is CSV file name without extension</a:t>
             </a:r>
           </a:p>
           <a:p>
@@ -4349,22 +4357,19 @@
             <a:pPr lvl="1"/>
             <a:r>
               <a:rPr lang="en-US" dirty="0"/>
-              <a:t>Level-1 Folders: Customer name</a:t>
-            </a:r>
+              <a:t>Level-1 Folders: </a:t>
+            </a:r>
+            <a:r>
+              <a:rPr lang="en-US"/>
+              <a:t>Customer abbreviation</a:t>
+            </a:r>
+            <a:endParaRPr lang="en-US" dirty="0"/>
           </a:p>
           <a:p>
             <a:pPr lvl="1"/>
             <a:r>
               <a:rPr lang="en-US" dirty="0"/>
-              <a:t>Level-2 Folders: IMPORT</a:t>
-            </a:r>
-            <a:r>
-              <a:rPr lang="en-US"/>
-              <a:t>, ARCHIVE</a:t>
-            </a:r>
-            <a:r>
-              <a:rPr lang="en-US" dirty="0"/>
-              <a:t>, and LOG</a:t>
+              <a:t>Level-2 Folders: IMPORT, ARCHIVE, and LOG</a:t>
             </a:r>
           </a:p>
           <a:p>
@@ -4377,6 +4382,432 @@
     <p:extLst>
       <p:ext uri="{BB962C8B-B14F-4D97-AF65-F5344CB8AC3E}">
         <p14:creationId xmlns:p14="http://schemas.microsoft.com/office/powerpoint/2010/main" val="1553196772"/>
+      </p:ext>
+    </p:extLst>
+  </p:cSld>
+  <p:clrMapOvr>
+    <a:masterClrMapping/>
+  </p:clrMapOvr>
+</p:sld>
+</file>
+
+<file path=ppt/slides/slide6.xml><?xml version="1.0" encoding="utf-8"?>
+<p:sld xmlns:a="http://schemas.openxmlformats.org/drawingml/2006/main" xmlns:r="http://schemas.openxmlformats.org/officeDocument/2006/relationships" xmlns:p="http://schemas.openxmlformats.org/presentationml/2006/main">
+  <p:cSld>
+    <p:spTree>
+      <p:nvGrpSpPr>
+        <p:cNvPr id="1" name=""/>
+        <p:cNvGrpSpPr/>
+        <p:nvPr/>
+      </p:nvGrpSpPr>
+      <p:grpSpPr>
+        <a:xfrm>
+          <a:off x="0" y="0"/>
+          <a:ext cx="0" cy="0"/>
+          <a:chOff x="0" y="0"/>
+          <a:chExt cx="0" cy="0"/>
+        </a:xfrm>
+      </p:grpSpPr>
+      <p:sp>
+        <p:nvSpPr>
+          <p:cNvPr id="2" name="Title 1">
+            <a:extLst>
+              <a:ext uri="{FF2B5EF4-FFF2-40B4-BE49-F238E27FC236}">
+                <a16:creationId xmlns:a16="http://schemas.microsoft.com/office/drawing/2014/main" id="{C12B4369-4798-4076-B256-7314E3FE2E1E}"/>
+              </a:ext>
+            </a:extLst>
+          </p:cNvPr>
+          <p:cNvSpPr>
+            <a:spLocks noGrp="1"/>
+          </p:cNvSpPr>
+          <p:nvPr>
+            <p:ph type="title"/>
+          </p:nvPr>
+        </p:nvSpPr>
+        <p:spPr/>
+        <p:txBody>
+          <a:bodyPr/>
+          <a:lstStyle/>
+          <a:p>
+            <a:r>
+              <a:rPr lang="en-US" dirty="0"/>
+              <a:t>Review Cmdlets in </a:t>
+            </a:r>
+            <a:r>
+              <a:rPr lang="en-US" dirty="0" err="1"/>
+              <a:t>ImportFramework</a:t>
+            </a:r>
+            <a:r>
+              <a:rPr lang="en-US" dirty="0"/>
+              <a:t> Module</a:t>
+            </a:r>
+          </a:p>
+        </p:txBody>
+      </p:sp>
+      <p:sp>
+        <p:nvSpPr>
+          <p:cNvPr id="3" name="Content Placeholder 2">
+            <a:extLst>
+              <a:ext uri="{FF2B5EF4-FFF2-40B4-BE49-F238E27FC236}">
+                <a16:creationId xmlns:a16="http://schemas.microsoft.com/office/drawing/2014/main" id="{89FBB29B-D904-47AC-BBFA-09E2BADE5862}"/>
+              </a:ext>
+            </a:extLst>
+          </p:cNvPr>
+          <p:cNvSpPr>
+            <a:spLocks noGrp="1"/>
+          </p:cNvSpPr>
+          <p:nvPr>
+            <p:ph idx="1"/>
+          </p:nvPr>
+        </p:nvSpPr>
+        <p:spPr/>
+        <p:txBody>
+          <a:bodyPr/>
+          <a:lstStyle/>
+          <a:p>
+            <a:r>
+              <a:rPr lang="en-US" sz="1800" dirty="0">
+                <a:solidFill>
+                  <a:srgbClr val="0000FF"/>
+                </a:solidFill>
+                <a:latin typeface="Lucida Console" panose="020B0609040504020204" pitchFamily="49" charset="0"/>
+              </a:rPr>
+              <a:t>Get-</a:t>
+            </a:r>
+            <a:r>
+              <a:rPr lang="en-US" sz="1800" dirty="0" err="1">
+                <a:solidFill>
+                  <a:srgbClr val="0000FF"/>
+                </a:solidFill>
+                <a:latin typeface="Lucida Console" panose="020B0609040504020204" pitchFamily="49" charset="0"/>
+              </a:rPr>
+              <a:t>ImportFrameworkConfiguration</a:t>
+            </a:r>
+            <a:r>
+              <a:rPr lang="en-US" sz="1800" dirty="0">
+                <a:solidFill>
+                  <a:srgbClr val="0000FF"/>
+                </a:solidFill>
+                <a:latin typeface="Lucida Console" panose="020B0609040504020204" pitchFamily="49" charset="0"/>
+              </a:rPr>
+              <a:t>: get configuration data in module </a:t>
+            </a:r>
+          </a:p>
+          <a:p>
+            <a:r>
+              <a:rPr lang="en-US" sz="1800" dirty="0">
+                <a:solidFill>
+                  <a:srgbClr val="0000FF"/>
+                </a:solidFill>
+                <a:latin typeface="Lucida Console" panose="020B0609040504020204" pitchFamily="49" charset="0"/>
+              </a:rPr>
+              <a:t>Get-</a:t>
+            </a:r>
+            <a:r>
+              <a:rPr lang="en-US" sz="1800" dirty="0" err="1">
+                <a:solidFill>
+                  <a:srgbClr val="0000FF"/>
+                </a:solidFill>
+                <a:latin typeface="Lucida Console" panose="020B0609040504020204" pitchFamily="49" charset="0"/>
+              </a:rPr>
+              <a:t>CsvCustomerPath</a:t>
+            </a:r>
+            <a:r>
+              <a:rPr lang="en-US" sz="1800" dirty="0">
+                <a:solidFill>
+                  <a:srgbClr val="0000FF"/>
+                </a:solidFill>
+                <a:latin typeface="Lucida Console" panose="020B0609040504020204" pitchFamily="49" charset="0"/>
+              </a:rPr>
+              <a:t>: get full path to the customer import folder; CSV files get dropped here  </a:t>
+            </a:r>
+          </a:p>
+          <a:p>
+            <a:r>
+              <a:rPr lang="en-US" sz="1800" dirty="0">
+                <a:solidFill>
+                  <a:srgbClr val="0000FF"/>
+                </a:solidFill>
+                <a:latin typeface="Lucida Console" panose="020B0609040504020204" pitchFamily="49" charset="0"/>
+              </a:rPr>
+              <a:t>Get-</a:t>
+            </a:r>
+            <a:r>
+              <a:rPr lang="en-US" sz="1800" dirty="0" err="1">
+                <a:solidFill>
+                  <a:srgbClr val="0000FF"/>
+                </a:solidFill>
+                <a:latin typeface="Lucida Console" panose="020B0609040504020204" pitchFamily="49" charset="0"/>
+              </a:rPr>
+              <a:t>AvailableCsvCustomerFile</a:t>
+            </a:r>
+            <a:r>
+              <a:rPr lang="en-US" sz="1800" dirty="0">
+                <a:solidFill>
+                  <a:srgbClr val="0000FF"/>
+                </a:solidFill>
+                <a:latin typeface="Lucida Console" panose="020B0609040504020204" pitchFamily="49" charset="0"/>
+              </a:rPr>
+              <a:t>: get the list of CSV files in the customer import folder </a:t>
+            </a:r>
+          </a:p>
+          <a:p>
+            <a:r>
+              <a:rPr lang="en-US" sz="1800" dirty="0">
+                <a:solidFill>
+                  <a:srgbClr val="0000FF"/>
+                </a:solidFill>
+                <a:latin typeface="Lucida Console" panose="020B0609040504020204" pitchFamily="49" charset="0"/>
+              </a:rPr>
+              <a:t>Import-</a:t>
+            </a:r>
+            <a:r>
+              <a:rPr lang="en-US" sz="1800" dirty="0" err="1">
+                <a:solidFill>
+                  <a:srgbClr val="0000FF"/>
+                </a:solidFill>
+                <a:latin typeface="Lucida Console" panose="020B0609040504020204" pitchFamily="49" charset="0"/>
+              </a:rPr>
+              <a:t>CsvCustomerFile</a:t>
+            </a:r>
+            <a:r>
+              <a:rPr lang="en-US" sz="1800" dirty="0">
+                <a:solidFill>
+                  <a:srgbClr val="0000FF"/>
+                </a:solidFill>
+                <a:latin typeface="Lucida Console" panose="020B0609040504020204" pitchFamily="49" charset="0"/>
+              </a:rPr>
+              <a:t>: import the available CSV files into their respective staging tables; move import files to archive folder  </a:t>
+            </a:r>
+          </a:p>
+          <a:p>
+            <a:endParaRPr lang="en-US" sz="1800" dirty="0">
+              <a:solidFill>
+                <a:srgbClr val="0000FF"/>
+              </a:solidFill>
+              <a:latin typeface="Lucida Console" panose="020B0609040504020204" pitchFamily="49" charset="0"/>
+            </a:endParaRPr>
+          </a:p>
+          <a:p>
+            <a:endParaRPr lang="en-US" sz="1800" dirty="0">
+              <a:solidFill>
+                <a:srgbClr val="0000FF"/>
+              </a:solidFill>
+              <a:latin typeface="Lucida Console" panose="020B0609040504020204" pitchFamily="49" charset="0"/>
+            </a:endParaRPr>
+          </a:p>
+          <a:p>
+            <a:endParaRPr lang="en-US" sz="1800" dirty="0">
+              <a:solidFill>
+                <a:srgbClr val="0000FF"/>
+              </a:solidFill>
+              <a:latin typeface="Lucida Console" panose="020B0609040504020204" pitchFamily="49" charset="0"/>
+            </a:endParaRPr>
+          </a:p>
+          <a:p>
+            <a:endParaRPr lang="en-US" dirty="0"/>
+          </a:p>
+        </p:txBody>
+      </p:sp>
+    </p:spTree>
+    <p:extLst>
+      <p:ext uri="{BB962C8B-B14F-4D97-AF65-F5344CB8AC3E}">
+        <p14:creationId xmlns:p14="http://schemas.microsoft.com/office/powerpoint/2010/main" val="1505845201"/>
+      </p:ext>
+    </p:extLst>
+  </p:cSld>
+  <p:clrMapOvr>
+    <a:masterClrMapping/>
+  </p:clrMapOvr>
+</p:sld>
+</file>
+
+<file path=ppt/slides/slide7.xml><?xml version="1.0" encoding="utf-8"?>
+<p:sld xmlns:a="http://schemas.openxmlformats.org/drawingml/2006/main" xmlns:r="http://schemas.openxmlformats.org/officeDocument/2006/relationships" xmlns:p="http://schemas.openxmlformats.org/presentationml/2006/main">
+  <p:cSld>
+    <p:spTree>
+      <p:nvGrpSpPr>
+        <p:cNvPr id="1" name=""/>
+        <p:cNvGrpSpPr/>
+        <p:nvPr/>
+      </p:nvGrpSpPr>
+      <p:grpSpPr>
+        <a:xfrm>
+          <a:off x="0" y="0"/>
+          <a:ext cx="0" cy="0"/>
+          <a:chOff x="0" y="0"/>
+          <a:chExt cx="0" cy="0"/>
+        </a:xfrm>
+      </p:grpSpPr>
+      <p:sp>
+        <p:nvSpPr>
+          <p:cNvPr id="2" name="Title 1">
+            <a:extLst>
+              <a:ext uri="{FF2B5EF4-FFF2-40B4-BE49-F238E27FC236}">
+                <a16:creationId xmlns:a16="http://schemas.microsoft.com/office/drawing/2014/main" id="{3ACC5081-6657-4055-A7BA-43C0E043B1E8}"/>
+              </a:ext>
+            </a:extLst>
+          </p:cNvPr>
+          <p:cNvSpPr>
+            <a:spLocks noGrp="1"/>
+          </p:cNvSpPr>
+          <p:nvPr>
+            <p:ph type="title"/>
+          </p:nvPr>
+        </p:nvSpPr>
+        <p:spPr/>
+        <p:txBody>
+          <a:bodyPr/>
+          <a:lstStyle/>
+          <a:p>
+            <a:r>
+              <a:rPr lang="en-US" dirty="0"/>
+              <a:t>Demo</a:t>
+            </a:r>
+          </a:p>
+        </p:txBody>
+      </p:sp>
+      <p:sp>
+        <p:nvSpPr>
+          <p:cNvPr id="3" name="Content Placeholder 2">
+            <a:extLst>
+              <a:ext uri="{FF2B5EF4-FFF2-40B4-BE49-F238E27FC236}">
+                <a16:creationId xmlns:a16="http://schemas.microsoft.com/office/drawing/2014/main" id="{8B63C7D9-019A-433B-9A26-F2581A948D1C}"/>
+              </a:ext>
+            </a:extLst>
+          </p:cNvPr>
+          <p:cNvSpPr>
+            <a:spLocks noGrp="1"/>
+          </p:cNvSpPr>
+          <p:nvPr>
+            <p:ph idx="1"/>
+          </p:nvPr>
+        </p:nvSpPr>
+        <p:spPr/>
+        <p:txBody>
+          <a:bodyPr/>
+          <a:lstStyle/>
+          <a:p>
+            <a:endParaRPr lang="en-US"/>
+          </a:p>
+        </p:txBody>
+      </p:sp>
+    </p:spTree>
+    <p:extLst>
+      <p:ext uri="{BB962C8B-B14F-4D97-AF65-F5344CB8AC3E}">
+        <p14:creationId xmlns:p14="http://schemas.microsoft.com/office/powerpoint/2010/main" val="2997414935"/>
+      </p:ext>
+    </p:extLst>
+  </p:cSld>
+  <p:clrMapOvr>
+    <a:masterClrMapping/>
+  </p:clrMapOvr>
+</p:sld>
+</file>
+
+<file path=ppt/slides/slide8.xml><?xml version="1.0" encoding="utf-8"?>
+<p:sld xmlns:a="http://schemas.openxmlformats.org/drawingml/2006/main" xmlns:r="http://schemas.openxmlformats.org/officeDocument/2006/relationships" xmlns:p="http://schemas.openxmlformats.org/presentationml/2006/main">
+  <p:cSld>
+    <p:spTree>
+      <p:nvGrpSpPr>
+        <p:cNvPr id="1" name=""/>
+        <p:cNvGrpSpPr/>
+        <p:nvPr/>
+      </p:nvGrpSpPr>
+      <p:grpSpPr>
+        <a:xfrm>
+          <a:off x="0" y="0"/>
+          <a:ext cx="0" cy="0"/>
+          <a:chOff x="0" y="0"/>
+          <a:chExt cx="0" cy="0"/>
+        </a:xfrm>
+      </p:grpSpPr>
+      <p:sp>
+        <p:nvSpPr>
+          <p:cNvPr id="2" name="Title 1">
+            <a:extLst>
+              <a:ext uri="{FF2B5EF4-FFF2-40B4-BE49-F238E27FC236}">
+                <a16:creationId xmlns:a16="http://schemas.microsoft.com/office/drawing/2014/main" id="{B8368FE9-12DF-4A34-9FBD-79DFC7C75700}"/>
+              </a:ext>
+            </a:extLst>
+          </p:cNvPr>
+          <p:cNvSpPr>
+            <a:spLocks noGrp="1"/>
+          </p:cNvSpPr>
+          <p:nvPr>
+            <p:ph type="title"/>
+          </p:nvPr>
+        </p:nvSpPr>
+        <p:spPr/>
+        <p:txBody>
+          <a:bodyPr/>
+          <a:lstStyle/>
+          <a:p>
+            <a:r>
+              <a:rPr lang="en-US" dirty="0"/>
+              <a:t>Book References</a:t>
+            </a:r>
+          </a:p>
+        </p:txBody>
+      </p:sp>
+      <p:sp>
+        <p:nvSpPr>
+          <p:cNvPr id="3" name="Content Placeholder 2">
+            <a:extLst>
+              <a:ext uri="{FF2B5EF4-FFF2-40B4-BE49-F238E27FC236}">
+                <a16:creationId xmlns:a16="http://schemas.microsoft.com/office/drawing/2014/main" id="{30A4F501-4D00-41C3-B198-E9B27E5553ED}"/>
+              </a:ext>
+            </a:extLst>
+          </p:cNvPr>
+          <p:cNvSpPr>
+            <a:spLocks noGrp="1"/>
+          </p:cNvSpPr>
+          <p:nvPr>
+            <p:ph idx="1"/>
+          </p:nvPr>
+        </p:nvSpPr>
+        <p:spPr/>
+        <p:txBody>
+          <a:bodyPr/>
+          <a:lstStyle/>
+          <a:p>
+            <a:r>
+              <a:rPr lang="en-US" dirty="0"/>
+              <a:t>Learn Windows PowerShell in a Month of Lunches by Don Jones and Jeffery Hicks</a:t>
+            </a:r>
+          </a:p>
+          <a:p>
+            <a:r>
+              <a:rPr lang="en-US" dirty="0"/>
+              <a:t>Learn PowerShell Scripting in a Month of Lunches by Don Jones and Jeffery Hicks</a:t>
+            </a:r>
+          </a:p>
+          <a:p>
+            <a:r>
+              <a:rPr lang="en-US" dirty="0"/>
+              <a:t>Windows PowerShell Cookbook by Lee Holmes</a:t>
+            </a:r>
+          </a:p>
+          <a:p>
+            <a:r>
+              <a:rPr lang="en-US" dirty="0"/>
+              <a:t>Windows PowerShell for Developers: Enhance Your Productivity and Enable Rapid Application Development </a:t>
+            </a:r>
+            <a:r>
+              <a:rPr lang="en-US"/>
+              <a:t>by Douglas Finke</a:t>
+            </a:r>
+            <a:endParaRPr lang="en-US" dirty="0"/>
+          </a:p>
+          <a:p>
+            <a:endParaRPr lang="en-US" dirty="0"/>
+          </a:p>
+        </p:txBody>
+      </p:sp>
+    </p:spTree>
+    <p:extLst>
+      <p:ext uri="{BB962C8B-B14F-4D97-AF65-F5344CB8AC3E}">
+        <p14:creationId xmlns:p14="http://schemas.microsoft.com/office/powerpoint/2010/main" val="1343061872"/>
       </p:ext>
     </p:extLst>
   </p:cSld>

</xml_diff>